<commit_message>
update original ppt file of reg_model example's block diagram
</commit_message>
<xml_diff>
--- a/example/4.reg_model/resource/Chipverify_regModel_2_Complete_UVCs_Block_Diagram.pptx
+++ b/example/4.reg_model/resource/Chipverify_regModel_2_Complete_UVCs_Block_Diagram.pptx
@@ -259,7 +259,7 @@
           <a:p>
             <a:fld id="{23DD17FB-2739-4771-AAD2-B52165E10269}" type="datetimeFigureOut">
               <a:rPr lang="ko-KR" altLang="en-US" smtClean="0"/>
-              <a:t>2022-01-25</a:t>
+              <a:t>2022-02-07</a:t>
             </a:fld>
             <a:endParaRPr lang="ko-KR" altLang="en-US"/>
           </a:p>
@@ -457,7 +457,7 @@
           <a:p>
             <a:fld id="{23DD17FB-2739-4771-AAD2-B52165E10269}" type="datetimeFigureOut">
               <a:rPr lang="ko-KR" altLang="en-US" smtClean="0"/>
-              <a:t>2022-01-25</a:t>
+              <a:t>2022-02-07</a:t>
             </a:fld>
             <a:endParaRPr lang="ko-KR" altLang="en-US"/>
           </a:p>
@@ -665,7 +665,7 @@
           <a:p>
             <a:fld id="{23DD17FB-2739-4771-AAD2-B52165E10269}" type="datetimeFigureOut">
               <a:rPr lang="ko-KR" altLang="en-US" smtClean="0"/>
-              <a:t>2022-01-25</a:t>
+              <a:t>2022-02-07</a:t>
             </a:fld>
             <a:endParaRPr lang="ko-KR" altLang="en-US"/>
           </a:p>
@@ -863,7 +863,7 @@
           <a:p>
             <a:fld id="{23DD17FB-2739-4771-AAD2-B52165E10269}" type="datetimeFigureOut">
               <a:rPr lang="ko-KR" altLang="en-US" smtClean="0"/>
-              <a:t>2022-01-25</a:t>
+              <a:t>2022-02-07</a:t>
             </a:fld>
             <a:endParaRPr lang="ko-KR" altLang="en-US"/>
           </a:p>
@@ -1138,7 +1138,7 @@
           <a:p>
             <a:fld id="{23DD17FB-2739-4771-AAD2-B52165E10269}" type="datetimeFigureOut">
               <a:rPr lang="ko-KR" altLang="en-US" smtClean="0"/>
-              <a:t>2022-01-25</a:t>
+              <a:t>2022-02-07</a:t>
             </a:fld>
             <a:endParaRPr lang="ko-KR" altLang="en-US"/>
           </a:p>
@@ -1403,7 +1403,7 @@
           <a:p>
             <a:fld id="{23DD17FB-2739-4771-AAD2-B52165E10269}" type="datetimeFigureOut">
               <a:rPr lang="ko-KR" altLang="en-US" smtClean="0"/>
-              <a:t>2022-01-25</a:t>
+              <a:t>2022-02-07</a:t>
             </a:fld>
             <a:endParaRPr lang="ko-KR" altLang="en-US"/>
           </a:p>
@@ -1815,7 +1815,7 @@
           <a:p>
             <a:fld id="{23DD17FB-2739-4771-AAD2-B52165E10269}" type="datetimeFigureOut">
               <a:rPr lang="ko-KR" altLang="en-US" smtClean="0"/>
-              <a:t>2022-01-25</a:t>
+              <a:t>2022-02-07</a:t>
             </a:fld>
             <a:endParaRPr lang="ko-KR" altLang="en-US"/>
           </a:p>
@@ -1956,7 +1956,7 @@
           <a:p>
             <a:fld id="{23DD17FB-2739-4771-AAD2-B52165E10269}" type="datetimeFigureOut">
               <a:rPr lang="ko-KR" altLang="en-US" smtClean="0"/>
-              <a:t>2022-01-25</a:t>
+              <a:t>2022-02-07</a:t>
             </a:fld>
             <a:endParaRPr lang="ko-KR" altLang="en-US"/>
           </a:p>
@@ -2069,7 +2069,7 @@
           <a:p>
             <a:fld id="{23DD17FB-2739-4771-AAD2-B52165E10269}" type="datetimeFigureOut">
               <a:rPr lang="ko-KR" altLang="en-US" smtClean="0"/>
-              <a:t>2022-01-25</a:t>
+              <a:t>2022-02-07</a:t>
             </a:fld>
             <a:endParaRPr lang="ko-KR" altLang="en-US"/>
           </a:p>
@@ -2380,7 +2380,7 @@
           <a:p>
             <a:fld id="{23DD17FB-2739-4771-AAD2-B52165E10269}" type="datetimeFigureOut">
               <a:rPr lang="ko-KR" altLang="en-US" smtClean="0"/>
-              <a:t>2022-01-25</a:t>
+              <a:t>2022-02-07</a:t>
             </a:fld>
             <a:endParaRPr lang="ko-KR" altLang="en-US"/>
           </a:p>
@@ -2668,7 +2668,7 @@
           <a:p>
             <a:fld id="{23DD17FB-2739-4771-AAD2-B52165E10269}" type="datetimeFigureOut">
               <a:rPr lang="ko-KR" altLang="en-US" smtClean="0"/>
-              <a:t>2022-01-25</a:t>
+              <a:t>2022-02-07</a:t>
             </a:fld>
             <a:endParaRPr lang="ko-KR" altLang="en-US"/>
           </a:p>
@@ -2909,7 +2909,7 @@
           <a:p>
             <a:fld id="{23DD17FB-2739-4771-AAD2-B52165E10269}" type="datetimeFigureOut">
               <a:rPr lang="ko-KR" altLang="en-US" smtClean="0"/>
-              <a:t>2022-01-25</a:t>
+              <a:t>2022-02-07</a:t>
             </a:fld>
             <a:endParaRPr lang="ko-KR" altLang="en-US"/>
           </a:p>
@@ -3376,7 +3376,7 @@
           <a:lstStyle/>
           <a:p>
             <a:pPr algn="ctr"/>
-            <a:endParaRPr lang="ko-KR" altLang="en-US"/>
+            <a:endParaRPr lang="ko-KR" altLang="en-US" dirty="0"/>
           </a:p>
         </p:txBody>
       </p:sp>
@@ -3395,7 +3395,7 @@
         <p:spPr>
           <a:xfrm>
             <a:off x="282180" y="184667"/>
-            <a:ext cx="8430746" cy="6473308"/>
+            <a:ext cx="9021840" cy="6473308"/>
           </a:xfrm>
           <a:prstGeom prst="rect">
             <a:avLst/>
@@ -3443,8 +3443,8 @@
         </p:nvSpPr>
         <p:spPr>
           <a:xfrm>
-            <a:off x="585787" y="574766"/>
-            <a:ext cx="7649522" cy="5956663"/>
+            <a:off x="585786" y="574766"/>
+            <a:ext cx="8481465" cy="5956663"/>
           </a:xfrm>
           <a:prstGeom prst="rect">
             <a:avLst/>
@@ -3529,7 +3529,7 @@
         <p:spPr>
           <a:xfrm>
             <a:off x="776360" y="2537095"/>
-            <a:ext cx="7226356" cy="3863705"/>
+            <a:ext cx="8055220" cy="3863705"/>
           </a:xfrm>
           <a:prstGeom prst="rect">
             <a:avLst/>
@@ -3612,7 +3612,7 @@
         </p:nvSpPr>
         <p:spPr>
           <a:xfrm>
-            <a:off x="9543854" y="880507"/>
+            <a:off x="9543854" y="766207"/>
             <a:ext cx="757238" cy="3591164"/>
           </a:xfrm>
           <a:prstGeom prst="rect">
@@ -3673,7 +3673,7 @@
         </p:nvSpPr>
         <p:spPr>
           <a:xfrm>
-            <a:off x="10777694" y="1256736"/>
+            <a:off x="10777694" y="1142436"/>
             <a:ext cx="1326359" cy="3278982"/>
           </a:xfrm>
           <a:prstGeom prst="rect">
@@ -3727,7 +3727,7 @@
         <p:spPr>
           <a:xfrm>
             <a:off x="2346342" y="691703"/>
-            <a:ext cx="5656374" cy="1695534"/>
+            <a:ext cx="6485238" cy="1695534"/>
           </a:xfrm>
           <a:prstGeom prst="rect">
             <a:avLst/>
@@ -3853,7 +3853,7 @@
         <p:spPr>
           <a:xfrm>
             <a:off x="880636" y="3792132"/>
-            <a:ext cx="6920486" cy="2491102"/>
+            <a:ext cx="7790924" cy="2491102"/>
           </a:xfrm>
           <a:prstGeom prst="rect">
             <a:avLst/>
@@ -3904,7 +3904,7 @@
         </p:nvSpPr>
         <p:spPr>
           <a:xfrm>
-            <a:off x="6089887" y="880508"/>
+            <a:off x="6737856" y="766208"/>
             <a:ext cx="1711235" cy="523024"/>
           </a:xfrm>
           <a:prstGeom prst="rect">
@@ -4138,8 +4138,8 @@
         </p:nvSpPr>
         <p:spPr>
           <a:xfrm>
-            <a:off x="1097184" y="4802209"/>
-            <a:ext cx="1667765" cy="1111207"/>
+            <a:off x="1088139" y="4666866"/>
+            <a:ext cx="1522481" cy="653519"/>
           </a:xfrm>
           <a:prstGeom prst="rect">
             <a:avLst/>
@@ -4202,8 +4202,8 @@
         </p:nvSpPr>
         <p:spPr>
           <a:xfrm>
-            <a:off x="2843213" y="4802209"/>
-            <a:ext cx="1522481" cy="1111207"/>
+            <a:off x="2780472" y="4666025"/>
+            <a:ext cx="1522481" cy="655200"/>
           </a:xfrm>
           <a:prstGeom prst="rect">
             <a:avLst/>
@@ -4229,24 +4229,15 @@
           <a:p>
             <a:pPr algn="ctr"/>
             <a:r>
-              <a:rPr lang="en-US" altLang="ko-KR" dirty="0" err="1"/>
+              <a:rPr lang="en-US" altLang="ko-KR"/>
               <a:t>ral_cfg_ctl</a:t>
             </a:r>
-            <a:endParaRPr lang="en-US" altLang="ko-KR" dirty="0"/>
           </a:p>
           <a:p>
             <a:pPr algn="ctr"/>
             <a:r>
-              <a:rPr lang="en-US" altLang="ko-KR" dirty="0"/>
-              <a:t>(</a:t>
-            </a:r>
-            <a:r>
-              <a:rPr lang="en-US" altLang="ko-KR" dirty="0" err="1"/>
-              <a:t>uvm_reg</a:t>
-            </a:r>
-            <a:r>
-              <a:rPr lang="en-US" altLang="ko-KR" dirty="0"/>
-              <a:t>)</a:t>
+              <a:rPr lang="en-US" altLang="ko-KR"/>
+              <a:t>(uvm_reg)</a:t>
             </a:r>
             <a:endParaRPr lang="ko-KR" altLang="en-US" dirty="0"/>
           </a:p>
@@ -4266,8 +4257,8 @@
         </p:nvSpPr>
         <p:spPr>
           <a:xfrm>
-            <a:off x="4443959" y="4802209"/>
-            <a:ext cx="1522481" cy="1111207"/>
+            <a:off x="4395410" y="4666025"/>
+            <a:ext cx="1522481" cy="655200"/>
           </a:xfrm>
           <a:prstGeom prst="rect">
             <a:avLst/>
@@ -4330,7 +4321,7 @@
         </p:nvSpPr>
         <p:spPr>
           <a:xfrm>
-            <a:off x="6089887" y="1537397"/>
+            <a:off x="6737856" y="1423097"/>
             <a:ext cx="1711235" cy="523024"/>
           </a:xfrm>
           <a:prstGeom prst="rect">
@@ -4383,7 +4374,7 @@
         </p:nvSpPr>
         <p:spPr>
           <a:xfrm>
-            <a:off x="5554311" y="2916676"/>
+            <a:off x="6470068" y="2911552"/>
             <a:ext cx="2246811" cy="598405"/>
           </a:xfrm>
           <a:prstGeom prst="rect">
@@ -4444,7 +4435,7 @@
         </p:nvSpPr>
         <p:spPr>
           <a:xfrm>
-            <a:off x="3172047" y="1522441"/>
+            <a:off x="3470628" y="1408141"/>
             <a:ext cx="2092135" cy="559754"/>
           </a:xfrm>
           <a:prstGeom prst="rect">
@@ -4483,67 +4474,6 @@
           </a:p>
         </p:txBody>
       </p:sp>
-      <p:sp>
-        <p:nvSpPr>
-          <p:cNvPr id="30" name="직사각형 29">
-            <a:extLst>
-              <a:ext uri="{FF2B5EF4-FFF2-40B4-BE49-F238E27FC236}">
-                <a16:creationId xmlns:a16="http://schemas.microsoft.com/office/drawing/2014/main" id="{7C90FAD7-0B77-4B64-8776-7F0FD0EF9AEF}"/>
-              </a:ext>
-            </a:extLst>
-          </p:cNvPr>
-          <p:cNvSpPr/>
-          <p:nvPr/>
-        </p:nvSpPr>
-        <p:spPr>
-          <a:xfrm>
-            <a:off x="3017371" y="2906427"/>
-            <a:ext cx="2246811" cy="598405"/>
-          </a:xfrm>
-          <a:prstGeom prst="rect">
-            <a:avLst/>
-          </a:prstGeom>
-          <a:solidFill>
-            <a:srgbClr val="FFFFCC"/>
-          </a:solidFill>
-        </p:spPr>
-        <p:style>
-          <a:lnRef idx="2">
-            <a:schemeClr val="accent1">
-              <a:shade val="50000"/>
-            </a:schemeClr>
-          </a:lnRef>
-          <a:fillRef idx="1">
-            <a:schemeClr val="accent1"/>
-          </a:fillRef>
-          <a:effectRef idx="0">
-            <a:schemeClr val="accent1"/>
-          </a:effectRef>
-          <a:fontRef idx="minor">
-            <a:schemeClr val="lt1"/>
-          </a:fontRef>
-        </p:style>
-        <p:txBody>
-          <a:bodyPr rtlCol="0" anchor="ctr"/>
-          <a:lstStyle/>
-          <a:p>
-            <a:pPr algn="ctr"/>
-            <a:r>
-              <a:rPr lang="en-US" altLang="ko-KR" dirty="0">
-                <a:solidFill>
-                  <a:sysClr val="windowText" lastClr="000000"/>
-                </a:solidFill>
-              </a:rPr>
-              <a:t>reg2apb_adapter</a:t>
-            </a:r>
-            <a:endParaRPr lang="ko-KR" altLang="en-US" dirty="0">
-              <a:solidFill>
-                <a:sysClr val="windowText" lastClr="000000"/>
-              </a:solidFill>
-            </a:endParaRPr>
-          </a:p>
-        </p:txBody>
-      </p:sp>
       <p:cxnSp>
         <p:nvCxnSpPr>
           <p:cNvPr id="32" name="직선 화살표 연결선 31">
@@ -4554,14 +4484,15 @@
             </a:extLst>
           </p:cNvPr>
           <p:cNvCxnSpPr>
+            <a:cxnSpLocks/>
             <a:stCxn id="15" idx="3"/>
           </p:cNvCxnSpPr>
           <p:nvPr/>
         </p:nvCxnSpPr>
         <p:spPr>
           <a:xfrm>
-            <a:off x="7801122" y="1142020"/>
-            <a:ext cx="1760555" cy="0"/>
+            <a:off x="8449091" y="1027720"/>
+            <a:ext cx="1094763" cy="0"/>
           </a:xfrm>
           <a:prstGeom prst="straightConnector1">
             <a:avLst/>
@@ -4604,8 +4535,8 @@
         </p:nvCxnSpPr>
         <p:spPr>
           <a:xfrm flipH="1">
-            <a:off x="7801122" y="1798909"/>
-            <a:ext cx="1742732" cy="0"/>
+            <a:off x="8449091" y="1798909"/>
+            <a:ext cx="1094763" cy="0"/>
           </a:xfrm>
           <a:prstGeom prst="straightConnector1">
             <a:avLst/>
@@ -4632,6 +4563,55 @@
           </a:fontRef>
         </p:style>
       </p:cxnSp>
+      <p:cxnSp>
+        <p:nvCxnSpPr>
+          <p:cNvPr id="48" name="연결선: 구부러짐 47">
+            <a:extLst>
+              <a:ext uri="{FF2B5EF4-FFF2-40B4-BE49-F238E27FC236}">
+                <a16:creationId xmlns:a16="http://schemas.microsoft.com/office/drawing/2014/main" id="{1ED8FA89-30D3-42EF-AD24-A318834E17C7}"/>
+              </a:ext>
+            </a:extLst>
+          </p:cNvPr>
+          <p:cNvCxnSpPr>
+            <a:cxnSpLocks/>
+            <a:stCxn id="38" idx="0"/>
+            <a:endCxn id="29" idx="1"/>
+          </p:cNvCxnSpPr>
+          <p:nvPr/>
+        </p:nvCxnSpPr>
+        <p:spPr>
+          <a:xfrm rot="16200000" flipV="1">
+            <a:off x="4280281" y="878366"/>
+            <a:ext cx="2635383" cy="4254687"/>
+          </a:xfrm>
+          <a:prstGeom prst="curvedConnector4">
+            <a:avLst>
+              <a:gd name="adj1" fmla="val 31679"/>
+              <a:gd name="adj2" fmla="val 105373"/>
+            </a:avLst>
+          </a:prstGeom>
+          <a:ln w="38100">
+            <a:solidFill>
+              <a:srgbClr val="FF0000"/>
+            </a:solidFill>
+            <a:tailEnd type="triangle"/>
+          </a:ln>
+        </p:spPr>
+        <p:style>
+          <a:lnRef idx="1">
+            <a:schemeClr val="accent1"/>
+          </a:lnRef>
+          <a:fillRef idx="0">
+            <a:schemeClr val="accent1"/>
+          </a:fillRef>
+          <a:effectRef idx="0">
+            <a:schemeClr val="accent1"/>
+          </a:effectRef>
+          <a:fontRef idx="minor">
+            <a:schemeClr val="tx1"/>
+          </a:fontRef>
+        </p:style>
+      </p:cxnSp>
       <p:sp>
         <p:nvSpPr>
           <p:cNvPr id="35" name="다이아몬드 34">
@@ -4646,7 +4626,7 @@
         </p:nvSpPr>
         <p:spPr>
           <a:xfrm>
-            <a:off x="6860962" y="2049748"/>
+            <a:off x="7599716" y="1961996"/>
             <a:ext cx="254214" cy="237491"/>
           </a:xfrm>
           <a:prstGeom prst="diamond">
@@ -4655,9 +4635,9 @@
           <a:solidFill>
             <a:srgbClr val="989899"/>
           </a:solidFill>
-          <a:ln w="28575">
+          <a:ln w="38100">
             <a:solidFill>
-              <a:schemeClr val="tx1"/>
+              <a:srgbClr val="0000FF"/>
             </a:solidFill>
           </a:ln>
         </p:spPr>
@@ -4703,15 +4683,15 @@
         </p:nvCxnSpPr>
         <p:spPr>
           <a:xfrm>
-            <a:off x="6988069" y="2287239"/>
-            <a:ext cx="0" cy="669087"/>
+            <a:off x="7726823" y="2199487"/>
+            <a:ext cx="0" cy="712065"/>
           </a:xfrm>
           <a:prstGeom prst="straightConnector1">
             <a:avLst/>
           </a:prstGeom>
-          <a:ln w="28575">
+          <a:ln w="38100">
             <a:solidFill>
-              <a:schemeClr val="tx1"/>
+              <a:srgbClr val="0000FF"/>
             </a:solidFill>
             <a:tailEnd type="triangle"/>
           </a:ln>
@@ -4745,7 +4725,7 @@
         </p:nvSpPr>
         <p:spPr>
           <a:xfrm>
-            <a:off x="6184263" y="4323401"/>
+            <a:off x="6964074" y="4323401"/>
             <a:ext cx="1522481" cy="1820225"/>
           </a:xfrm>
           <a:prstGeom prst="rect">
@@ -4789,54 +4769,6 @@
       </p:sp>
       <p:cxnSp>
         <p:nvCxnSpPr>
-          <p:cNvPr id="48" name="연결선: 구부러짐 47">
-            <a:extLst>
-              <a:ext uri="{FF2B5EF4-FFF2-40B4-BE49-F238E27FC236}">
-                <a16:creationId xmlns:a16="http://schemas.microsoft.com/office/drawing/2014/main" id="{1ED8FA89-30D3-42EF-AD24-A318834E17C7}"/>
-              </a:ext>
-            </a:extLst>
-          </p:cNvPr>
-          <p:cNvCxnSpPr>
-            <a:stCxn id="38" idx="0"/>
-            <a:endCxn id="29" idx="1"/>
-          </p:cNvCxnSpPr>
-          <p:nvPr/>
-        </p:nvCxnSpPr>
-        <p:spPr>
-          <a:xfrm rot="16200000" flipV="1">
-            <a:off x="3798235" y="1176131"/>
-            <a:ext cx="2521083" cy="3773457"/>
-          </a:xfrm>
-          <a:prstGeom prst="curvedConnector4">
-            <a:avLst>
-              <a:gd name="adj1" fmla="val 20680"/>
-              <a:gd name="adj2" fmla="val 124990"/>
-            </a:avLst>
-          </a:prstGeom>
-          <a:ln w="28575">
-            <a:solidFill>
-              <a:schemeClr val="tx1"/>
-            </a:solidFill>
-            <a:tailEnd type="triangle"/>
-          </a:ln>
-        </p:spPr>
-        <p:style>
-          <a:lnRef idx="1">
-            <a:schemeClr val="accent1"/>
-          </a:lnRef>
-          <a:fillRef idx="0">
-            <a:schemeClr val="accent1"/>
-          </a:fillRef>
-          <a:effectRef idx="0">
-            <a:schemeClr val="accent1"/>
-          </a:effectRef>
-          <a:fontRef idx="minor">
-            <a:schemeClr val="tx1"/>
-          </a:fontRef>
-        </p:style>
-      </p:cxnSp>
-      <p:cxnSp>
-        <p:nvCxnSpPr>
           <p:cNvPr id="33" name="직선 화살표 연결선 32">
             <a:extLst>
               <a:ext uri="{FF2B5EF4-FFF2-40B4-BE49-F238E27FC236}">
@@ -4940,8 +4872,8 @@
         </p:nvCxnSpPr>
         <p:spPr>
           <a:xfrm flipV="1">
-            <a:off x="5264182" y="1142020"/>
-            <a:ext cx="825705" cy="656890"/>
+            <a:off x="5564352" y="1027720"/>
+            <a:ext cx="1173504" cy="656890"/>
           </a:xfrm>
           <a:prstGeom prst="straightConnector1">
             <a:avLst/>
@@ -4951,6 +4883,968 @@
               <a:schemeClr val="tx1"/>
             </a:solidFill>
             <a:tailEnd type="triangle"/>
+          </a:ln>
+        </p:spPr>
+        <p:style>
+          <a:lnRef idx="1">
+            <a:schemeClr val="accent1"/>
+          </a:lnRef>
+          <a:fillRef idx="0">
+            <a:schemeClr val="accent1"/>
+          </a:fillRef>
+          <a:effectRef idx="0">
+            <a:schemeClr val="accent1"/>
+          </a:effectRef>
+          <a:fontRef idx="minor">
+            <a:schemeClr val="tx1"/>
+          </a:fontRef>
+        </p:style>
+      </p:cxnSp>
+      <p:cxnSp>
+        <p:nvCxnSpPr>
+          <p:cNvPr id="3" name="직선 화살표 연결선 2">
+            <a:extLst>
+              <a:ext uri="{FF2B5EF4-FFF2-40B4-BE49-F238E27FC236}">
+                <a16:creationId xmlns:a16="http://schemas.microsoft.com/office/drawing/2014/main" id="{AAC0C908-8FD0-4645-A1C8-2E5A334B31B6}"/>
+              </a:ext>
+            </a:extLst>
+          </p:cNvPr>
+          <p:cNvCxnSpPr>
+            <a:cxnSpLocks/>
+          </p:cNvCxnSpPr>
+          <p:nvPr/>
+        </p:nvCxnSpPr>
+        <p:spPr>
+          <a:xfrm>
+            <a:off x="7720580" y="3504832"/>
+            <a:ext cx="0" cy="806490"/>
+          </a:xfrm>
+          <a:prstGeom prst="straightConnector1">
+            <a:avLst/>
+          </a:prstGeom>
+          <a:ln w="38100">
+            <a:solidFill>
+              <a:srgbClr val="0000FF"/>
+            </a:solidFill>
+            <a:tailEnd type="triangle"/>
+          </a:ln>
+        </p:spPr>
+        <p:style>
+          <a:lnRef idx="1">
+            <a:schemeClr val="accent1"/>
+          </a:lnRef>
+          <a:fillRef idx="0">
+            <a:schemeClr val="accent1"/>
+          </a:fillRef>
+          <a:effectRef idx="0">
+            <a:schemeClr val="accent1"/>
+          </a:effectRef>
+          <a:fontRef idx="minor">
+            <a:schemeClr val="tx1"/>
+          </a:fontRef>
+        </p:style>
+      </p:cxnSp>
+      <p:cxnSp>
+        <p:nvCxnSpPr>
+          <p:cNvPr id="17" name="직선 연결선 16">
+            <a:extLst>
+              <a:ext uri="{FF2B5EF4-FFF2-40B4-BE49-F238E27FC236}">
+                <a16:creationId xmlns:a16="http://schemas.microsoft.com/office/drawing/2014/main" id="{F5F486DC-F037-4DFB-A4EB-031244D2E4D3}"/>
+              </a:ext>
+            </a:extLst>
+          </p:cNvPr>
+          <p:cNvCxnSpPr>
+            <a:stCxn id="30" idx="3"/>
+            <a:endCxn id="28" idx="1"/>
+          </p:cNvCxnSpPr>
+          <p:nvPr/>
+        </p:nvCxnSpPr>
+        <p:spPr>
+          <a:xfrm>
+            <a:off x="5058776" y="3210755"/>
+            <a:ext cx="1411292" cy="0"/>
+          </a:xfrm>
+          <a:prstGeom prst="line">
+            <a:avLst/>
+          </a:prstGeom>
+          <a:ln w="38100">
+            <a:solidFill>
+              <a:srgbClr val="0000FF"/>
+            </a:solidFill>
+            <a:headEnd type="arrow" w="med" len="med"/>
+            <a:tailEnd type="arrow" w="med" len="med"/>
+          </a:ln>
+        </p:spPr>
+        <p:style>
+          <a:lnRef idx="1">
+            <a:schemeClr val="accent1"/>
+          </a:lnRef>
+          <a:fillRef idx="0">
+            <a:schemeClr val="accent1"/>
+          </a:fillRef>
+          <a:effectRef idx="0">
+            <a:schemeClr val="accent1"/>
+          </a:effectRef>
+          <a:fontRef idx="minor">
+            <a:schemeClr val="tx1"/>
+          </a:fontRef>
+        </p:style>
+      </p:cxnSp>
+      <p:sp>
+        <p:nvSpPr>
+          <p:cNvPr id="30" name="직사각형 29">
+            <a:extLst>
+              <a:ext uri="{FF2B5EF4-FFF2-40B4-BE49-F238E27FC236}">
+                <a16:creationId xmlns:a16="http://schemas.microsoft.com/office/drawing/2014/main" id="{7C90FAD7-0B77-4B64-8776-7F0FD0EF9AEF}"/>
+              </a:ext>
+            </a:extLst>
+          </p:cNvPr>
+          <p:cNvSpPr/>
+          <p:nvPr/>
+        </p:nvSpPr>
+        <p:spPr>
+          <a:xfrm>
+            <a:off x="2811965" y="2911552"/>
+            <a:ext cx="2246811" cy="598405"/>
+          </a:xfrm>
+          <a:prstGeom prst="rect">
+            <a:avLst/>
+          </a:prstGeom>
+          <a:solidFill>
+            <a:srgbClr val="FFFFCC"/>
+          </a:solidFill>
+        </p:spPr>
+        <p:style>
+          <a:lnRef idx="2">
+            <a:schemeClr val="accent1">
+              <a:shade val="50000"/>
+            </a:schemeClr>
+          </a:lnRef>
+          <a:fillRef idx="1">
+            <a:schemeClr val="accent1"/>
+          </a:fillRef>
+          <a:effectRef idx="0">
+            <a:schemeClr val="accent1"/>
+          </a:effectRef>
+          <a:fontRef idx="minor">
+            <a:schemeClr val="lt1"/>
+          </a:fontRef>
+        </p:style>
+        <p:txBody>
+          <a:bodyPr rtlCol="0" anchor="ctr"/>
+          <a:lstStyle/>
+          <a:p>
+            <a:pPr algn="ctr"/>
+            <a:r>
+              <a:rPr lang="en-US" altLang="ko-KR" dirty="0">
+                <a:solidFill>
+                  <a:sysClr val="windowText" lastClr="000000"/>
+                </a:solidFill>
+              </a:rPr>
+              <a:t>reg2apb_adapter</a:t>
+            </a:r>
+            <a:endParaRPr lang="ko-KR" altLang="en-US" dirty="0">
+              <a:solidFill>
+                <a:sysClr val="windowText" lastClr="000000"/>
+              </a:solidFill>
+            </a:endParaRPr>
+          </a:p>
+        </p:txBody>
+      </p:sp>
+      <p:cxnSp>
+        <p:nvCxnSpPr>
+          <p:cNvPr id="31" name="직선 화살표 연결선 30">
+            <a:extLst>
+              <a:ext uri="{FF2B5EF4-FFF2-40B4-BE49-F238E27FC236}">
+                <a16:creationId xmlns:a16="http://schemas.microsoft.com/office/drawing/2014/main" id="{5471B5EA-DFC7-400C-A281-AEA7FB561098}"/>
+              </a:ext>
+            </a:extLst>
+          </p:cNvPr>
+          <p:cNvCxnSpPr>
+            <a:cxnSpLocks/>
+            <a:stCxn id="30" idx="2"/>
+            <a:endCxn id="38" idx="0"/>
+          </p:cNvCxnSpPr>
+          <p:nvPr/>
+        </p:nvCxnSpPr>
+        <p:spPr>
+          <a:xfrm>
+            <a:off x="3935371" y="3509957"/>
+            <a:ext cx="3789944" cy="813444"/>
+          </a:xfrm>
+          <a:prstGeom prst="straightConnector1">
+            <a:avLst/>
+          </a:prstGeom>
+          <a:ln w="38100">
+            <a:solidFill>
+              <a:srgbClr val="FF0000"/>
+            </a:solidFill>
+            <a:headEnd type="triangle"/>
+            <a:tailEnd type="triangle"/>
+          </a:ln>
+        </p:spPr>
+        <p:style>
+          <a:lnRef idx="1">
+            <a:schemeClr val="accent1"/>
+          </a:lnRef>
+          <a:fillRef idx="0">
+            <a:schemeClr val="accent1"/>
+          </a:fillRef>
+          <a:effectRef idx="0">
+            <a:schemeClr val="accent1"/>
+          </a:effectRef>
+          <a:fontRef idx="minor">
+            <a:schemeClr val="tx1"/>
+          </a:fontRef>
+        </p:style>
+      </p:cxnSp>
+      <p:sp>
+        <p:nvSpPr>
+          <p:cNvPr id="43" name="직사각형 42">
+            <a:extLst>
+              <a:ext uri="{FF2B5EF4-FFF2-40B4-BE49-F238E27FC236}">
+                <a16:creationId xmlns:a16="http://schemas.microsoft.com/office/drawing/2014/main" id="{ED1B12A9-154B-48FE-9256-A678DAA183D0}"/>
+              </a:ext>
+            </a:extLst>
+          </p:cNvPr>
+          <p:cNvSpPr/>
+          <p:nvPr/>
+        </p:nvSpPr>
+        <p:spPr>
+          <a:xfrm>
+            <a:off x="1088139" y="5699104"/>
+            <a:ext cx="4829752" cy="357117"/>
+          </a:xfrm>
+          <a:prstGeom prst="rect">
+            <a:avLst/>
+          </a:prstGeom>
+          <a:solidFill>
+            <a:srgbClr val="CCCCFF"/>
+          </a:solidFill>
+          <a:ln>
+            <a:solidFill>
+              <a:schemeClr val="tx1"/>
+            </a:solidFill>
+          </a:ln>
+        </p:spPr>
+        <p:style>
+          <a:lnRef idx="1">
+            <a:schemeClr val="accent6"/>
+          </a:lnRef>
+          <a:fillRef idx="2">
+            <a:schemeClr val="accent6"/>
+          </a:fillRef>
+          <a:effectRef idx="1">
+            <a:schemeClr val="accent6"/>
+          </a:effectRef>
+          <a:fontRef idx="minor">
+            <a:schemeClr val="dk1"/>
+          </a:fontRef>
+        </p:style>
+        <p:txBody>
+          <a:bodyPr rtlCol="0" anchor="ctr"/>
+          <a:lstStyle/>
+          <a:p>
+            <a:pPr algn="ctr"/>
+            <a:r>
+              <a:rPr lang="en-US" altLang="ko-KR" dirty="0" err="1"/>
+              <a:t>default_map</a:t>
+            </a:r>
+            <a:endParaRPr lang="en-US" altLang="ko-KR" dirty="0"/>
+          </a:p>
+        </p:txBody>
+      </p:sp>
+      <p:cxnSp>
+        <p:nvCxnSpPr>
+          <p:cNvPr id="42" name="직선 연결선 41">
+            <a:extLst>
+              <a:ext uri="{FF2B5EF4-FFF2-40B4-BE49-F238E27FC236}">
+                <a16:creationId xmlns:a16="http://schemas.microsoft.com/office/drawing/2014/main" id="{33A0EEAD-5AA0-425A-97A9-4C1149F3CA9F}"/>
+              </a:ext>
+            </a:extLst>
+          </p:cNvPr>
+          <p:cNvCxnSpPr>
+            <a:cxnSpLocks/>
+            <a:stCxn id="24" idx="2"/>
+          </p:cNvCxnSpPr>
+          <p:nvPr/>
+        </p:nvCxnSpPr>
+        <p:spPr>
+          <a:xfrm>
+            <a:off x="1849380" y="5320385"/>
+            <a:ext cx="0" cy="378719"/>
+          </a:xfrm>
+          <a:prstGeom prst="line">
+            <a:avLst/>
+          </a:prstGeom>
+          <a:ln w="38100">
+            <a:solidFill>
+              <a:schemeClr val="tx1"/>
+            </a:solidFill>
+          </a:ln>
+        </p:spPr>
+        <p:style>
+          <a:lnRef idx="1">
+            <a:schemeClr val="accent1"/>
+          </a:lnRef>
+          <a:fillRef idx="0">
+            <a:schemeClr val="accent1"/>
+          </a:fillRef>
+          <a:effectRef idx="0">
+            <a:schemeClr val="accent1"/>
+          </a:effectRef>
+          <a:fontRef idx="minor">
+            <a:schemeClr val="tx1"/>
+          </a:fontRef>
+        </p:style>
+      </p:cxnSp>
+      <p:cxnSp>
+        <p:nvCxnSpPr>
+          <p:cNvPr id="49" name="직선 연결선 48">
+            <a:extLst>
+              <a:ext uri="{FF2B5EF4-FFF2-40B4-BE49-F238E27FC236}">
+                <a16:creationId xmlns:a16="http://schemas.microsoft.com/office/drawing/2014/main" id="{C0F0905B-8D1E-4D8F-993E-9950F45B9B42}"/>
+              </a:ext>
+            </a:extLst>
+          </p:cNvPr>
+          <p:cNvCxnSpPr>
+            <a:cxnSpLocks/>
+          </p:cNvCxnSpPr>
+          <p:nvPr/>
+        </p:nvCxnSpPr>
+        <p:spPr>
+          <a:xfrm>
+            <a:off x="3589707" y="5325784"/>
+            <a:ext cx="0" cy="373320"/>
+          </a:xfrm>
+          <a:prstGeom prst="line">
+            <a:avLst/>
+          </a:prstGeom>
+          <a:ln w="38100">
+            <a:solidFill>
+              <a:schemeClr val="tx1"/>
+            </a:solidFill>
+          </a:ln>
+        </p:spPr>
+        <p:style>
+          <a:lnRef idx="1">
+            <a:schemeClr val="accent1"/>
+          </a:lnRef>
+          <a:fillRef idx="0">
+            <a:schemeClr val="accent1"/>
+          </a:fillRef>
+          <a:effectRef idx="0">
+            <a:schemeClr val="accent1"/>
+          </a:effectRef>
+          <a:fontRef idx="minor">
+            <a:schemeClr val="tx1"/>
+          </a:fontRef>
+        </p:style>
+      </p:cxnSp>
+      <p:cxnSp>
+        <p:nvCxnSpPr>
+          <p:cNvPr id="50" name="직선 연결선 49">
+            <a:extLst>
+              <a:ext uri="{FF2B5EF4-FFF2-40B4-BE49-F238E27FC236}">
+                <a16:creationId xmlns:a16="http://schemas.microsoft.com/office/drawing/2014/main" id="{978277EC-9AF3-43DE-8FC5-BB07B8489F77}"/>
+              </a:ext>
+            </a:extLst>
+          </p:cNvPr>
+          <p:cNvCxnSpPr>
+            <a:cxnSpLocks/>
+          </p:cNvCxnSpPr>
+          <p:nvPr/>
+        </p:nvCxnSpPr>
+        <p:spPr>
+          <a:xfrm>
+            <a:off x="5132757" y="5325784"/>
+            <a:ext cx="0" cy="373320"/>
+          </a:xfrm>
+          <a:prstGeom prst="line">
+            <a:avLst/>
+          </a:prstGeom>
+          <a:ln w="38100">
+            <a:solidFill>
+              <a:schemeClr val="tx1"/>
+            </a:solidFill>
+          </a:ln>
+        </p:spPr>
+        <p:style>
+          <a:lnRef idx="1">
+            <a:schemeClr val="accent1"/>
+          </a:lnRef>
+          <a:fillRef idx="0">
+            <a:schemeClr val="accent1"/>
+          </a:fillRef>
+          <a:effectRef idx="0">
+            <a:schemeClr val="accent1"/>
+          </a:effectRef>
+          <a:fontRef idx="minor">
+            <a:schemeClr val="tx1"/>
+          </a:fontRef>
+        </p:style>
+      </p:cxnSp>
+      <p:cxnSp>
+        <p:nvCxnSpPr>
+          <p:cNvPr id="53" name="직선 연결선 52">
+            <a:extLst>
+              <a:ext uri="{FF2B5EF4-FFF2-40B4-BE49-F238E27FC236}">
+                <a16:creationId xmlns:a16="http://schemas.microsoft.com/office/drawing/2014/main" id="{0626F11B-42DC-4FB7-8BC5-79F0620EC5E8}"/>
+              </a:ext>
+            </a:extLst>
+          </p:cNvPr>
+          <p:cNvCxnSpPr>
+            <a:cxnSpLocks/>
+            <a:stCxn id="43" idx="3"/>
+          </p:cNvCxnSpPr>
+          <p:nvPr/>
+        </p:nvCxnSpPr>
+        <p:spPr>
+          <a:xfrm>
+            <a:off x="5917891" y="5877663"/>
+            <a:ext cx="1046183" cy="0"/>
+          </a:xfrm>
+          <a:prstGeom prst="line">
+            <a:avLst/>
+          </a:prstGeom>
+          <a:ln w="38100"/>
+        </p:spPr>
+        <p:style>
+          <a:lnRef idx="1">
+            <a:schemeClr val="dk1"/>
+          </a:lnRef>
+          <a:fillRef idx="0">
+            <a:schemeClr val="dk1"/>
+          </a:fillRef>
+          <a:effectRef idx="0">
+            <a:schemeClr val="dk1"/>
+          </a:effectRef>
+          <a:fontRef idx="minor">
+            <a:schemeClr val="tx1"/>
+          </a:fontRef>
+        </p:style>
+      </p:cxnSp>
+      <p:sp>
+        <p:nvSpPr>
+          <p:cNvPr id="82" name="TextBox 81">
+            <a:extLst>
+              <a:ext uri="{FF2B5EF4-FFF2-40B4-BE49-F238E27FC236}">
+                <a16:creationId xmlns:a16="http://schemas.microsoft.com/office/drawing/2014/main" id="{B76AA7AD-9145-4633-A3DE-F47D37523EB8}"/>
+              </a:ext>
+            </a:extLst>
+          </p:cNvPr>
+          <p:cNvSpPr txBox="1"/>
+          <p:nvPr/>
+        </p:nvSpPr>
+        <p:spPr>
+          <a:xfrm>
+            <a:off x="1811066" y="5368735"/>
+            <a:ext cx="836511" cy="276999"/>
+          </a:xfrm>
+          <a:prstGeom prst="rect">
+            <a:avLst/>
+          </a:prstGeom>
+          <a:noFill/>
+        </p:spPr>
+        <p:txBody>
+          <a:bodyPr wrap="none" rtlCol="0">
+            <a:spAutoFit/>
+          </a:bodyPr>
+          <a:lstStyle/>
+          <a:p>
+            <a:r>
+              <a:rPr lang="en-US" altLang="ko-KR" sz="1200" dirty="0" err="1"/>
+              <a:t>add_reg</a:t>
+            </a:r>
+            <a:r>
+              <a:rPr lang="en-US" altLang="ko-KR" sz="1200" dirty="0"/>
+              <a:t>()</a:t>
+            </a:r>
+            <a:endParaRPr lang="ko-KR" altLang="en-US" sz="1200" dirty="0"/>
+          </a:p>
+        </p:txBody>
+      </p:sp>
+      <p:sp>
+        <p:nvSpPr>
+          <p:cNvPr id="83" name="TextBox 82">
+            <a:extLst>
+              <a:ext uri="{FF2B5EF4-FFF2-40B4-BE49-F238E27FC236}">
+                <a16:creationId xmlns:a16="http://schemas.microsoft.com/office/drawing/2014/main" id="{36278077-80C9-4C1D-86DA-4DF90F1D7F4B}"/>
+              </a:ext>
+            </a:extLst>
+          </p:cNvPr>
+          <p:cNvSpPr txBox="1"/>
+          <p:nvPr/>
+        </p:nvSpPr>
+        <p:spPr>
+          <a:xfrm>
+            <a:off x="3592152" y="5368735"/>
+            <a:ext cx="836511" cy="276999"/>
+          </a:xfrm>
+          <a:prstGeom prst="rect">
+            <a:avLst/>
+          </a:prstGeom>
+          <a:noFill/>
+        </p:spPr>
+        <p:txBody>
+          <a:bodyPr wrap="none" rtlCol="0">
+            <a:spAutoFit/>
+          </a:bodyPr>
+          <a:lstStyle/>
+          <a:p>
+            <a:r>
+              <a:rPr lang="en-US" altLang="ko-KR" sz="1200" dirty="0" err="1"/>
+              <a:t>add_reg</a:t>
+            </a:r>
+            <a:r>
+              <a:rPr lang="en-US" altLang="ko-KR" sz="1200" dirty="0"/>
+              <a:t>()</a:t>
+            </a:r>
+            <a:endParaRPr lang="ko-KR" altLang="en-US" sz="1200" dirty="0"/>
+          </a:p>
+        </p:txBody>
+      </p:sp>
+      <p:sp>
+        <p:nvSpPr>
+          <p:cNvPr id="88" name="TextBox 87">
+            <a:extLst>
+              <a:ext uri="{FF2B5EF4-FFF2-40B4-BE49-F238E27FC236}">
+                <a16:creationId xmlns:a16="http://schemas.microsoft.com/office/drawing/2014/main" id="{A054F7B8-305D-4266-B2BC-2044EEF09C7D}"/>
+              </a:ext>
+            </a:extLst>
+          </p:cNvPr>
+          <p:cNvSpPr txBox="1"/>
+          <p:nvPr/>
+        </p:nvSpPr>
+        <p:spPr>
+          <a:xfrm>
+            <a:off x="5144507" y="5368735"/>
+            <a:ext cx="836511" cy="276999"/>
+          </a:xfrm>
+          <a:prstGeom prst="rect">
+            <a:avLst/>
+          </a:prstGeom>
+          <a:noFill/>
+        </p:spPr>
+        <p:txBody>
+          <a:bodyPr wrap="none" rtlCol="0">
+            <a:spAutoFit/>
+          </a:bodyPr>
+          <a:lstStyle/>
+          <a:p>
+            <a:r>
+              <a:rPr lang="en-US" altLang="ko-KR" sz="1200" dirty="0" err="1"/>
+              <a:t>add_reg</a:t>
+            </a:r>
+            <a:r>
+              <a:rPr lang="en-US" altLang="ko-KR" sz="1200" dirty="0"/>
+              <a:t>()</a:t>
+            </a:r>
+            <a:endParaRPr lang="ko-KR" altLang="en-US" sz="1200" dirty="0"/>
+          </a:p>
+        </p:txBody>
+      </p:sp>
+      <p:sp>
+        <p:nvSpPr>
+          <p:cNvPr id="89" name="TextBox 88">
+            <a:extLst>
+              <a:ext uri="{FF2B5EF4-FFF2-40B4-BE49-F238E27FC236}">
+                <a16:creationId xmlns:a16="http://schemas.microsoft.com/office/drawing/2014/main" id="{3CA78F8D-A6E6-4398-83F6-DC502AE7E3C2}"/>
+              </a:ext>
+            </a:extLst>
+          </p:cNvPr>
+          <p:cNvSpPr txBox="1"/>
+          <p:nvPr/>
+        </p:nvSpPr>
+        <p:spPr>
+          <a:xfrm>
+            <a:off x="5883988" y="5554744"/>
+            <a:ext cx="1128528" cy="276999"/>
+          </a:xfrm>
+          <a:prstGeom prst="rect">
+            <a:avLst/>
+          </a:prstGeom>
+          <a:noFill/>
+        </p:spPr>
+        <p:txBody>
+          <a:bodyPr wrap="square" rtlCol="0">
+            <a:spAutoFit/>
+          </a:bodyPr>
+          <a:lstStyle/>
+          <a:p>
+            <a:r>
+              <a:rPr lang="en-US" altLang="ko-KR" sz="1200" dirty="0" err="1"/>
+              <a:t>add_submap</a:t>
+            </a:r>
+            <a:r>
+              <a:rPr lang="en-US" altLang="ko-KR" sz="1200" dirty="0"/>
+              <a:t>()</a:t>
+            </a:r>
+            <a:endParaRPr lang="ko-KR" altLang="en-US" sz="1200" dirty="0"/>
+          </a:p>
+        </p:txBody>
+      </p:sp>
+      <p:sp>
+        <p:nvSpPr>
+          <p:cNvPr id="98" name="TextBox 97">
+            <a:extLst>
+              <a:ext uri="{FF2B5EF4-FFF2-40B4-BE49-F238E27FC236}">
+                <a16:creationId xmlns:a16="http://schemas.microsoft.com/office/drawing/2014/main" id="{47056146-DB70-4365-A638-5F247257B6FE}"/>
+              </a:ext>
+            </a:extLst>
+          </p:cNvPr>
+          <p:cNvSpPr txBox="1"/>
+          <p:nvPr/>
+        </p:nvSpPr>
+        <p:spPr>
+          <a:xfrm>
+            <a:off x="7789305" y="2017535"/>
+            <a:ext cx="364922" cy="369332"/>
+          </a:xfrm>
+          <a:prstGeom prst="rect">
+            <a:avLst/>
+          </a:prstGeom>
+          <a:noFill/>
+        </p:spPr>
+        <p:txBody>
+          <a:bodyPr wrap="square" rtlCol="0">
+            <a:spAutoFit/>
+          </a:bodyPr>
+          <a:lstStyle/>
+          <a:p>
+            <a:r>
+              <a:rPr lang="ko-KR" altLang="en-US" b="1" dirty="0">
+                <a:solidFill>
+                  <a:srgbClr val="0000FF"/>
+                </a:solidFill>
+              </a:rPr>
+              <a:t>①</a:t>
+            </a:r>
+          </a:p>
+        </p:txBody>
+      </p:sp>
+      <p:sp>
+        <p:nvSpPr>
+          <p:cNvPr id="101" name="TextBox 100">
+            <a:extLst>
+              <a:ext uri="{FF2B5EF4-FFF2-40B4-BE49-F238E27FC236}">
+                <a16:creationId xmlns:a16="http://schemas.microsoft.com/office/drawing/2014/main" id="{8057CB8B-6321-4FF3-9E54-BE7F7007BD5F}"/>
+              </a:ext>
+            </a:extLst>
+          </p:cNvPr>
+          <p:cNvSpPr txBox="1"/>
+          <p:nvPr/>
+        </p:nvSpPr>
+        <p:spPr>
+          <a:xfrm>
+            <a:off x="5588822" y="2836730"/>
+            <a:ext cx="382513" cy="369332"/>
+          </a:xfrm>
+          <a:prstGeom prst="rect">
+            <a:avLst/>
+          </a:prstGeom>
+          <a:noFill/>
+        </p:spPr>
+        <p:txBody>
+          <a:bodyPr wrap="square" rtlCol="0">
+            <a:spAutoFit/>
+          </a:bodyPr>
+          <a:lstStyle/>
+          <a:p>
+            <a:r>
+              <a:rPr lang="ko-KR" altLang="en-US" b="1" dirty="0">
+                <a:solidFill>
+                  <a:srgbClr val="0000FF"/>
+                </a:solidFill>
+              </a:rPr>
+              <a:t>②</a:t>
+            </a:r>
+          </a:p>
+        </p:txBody>
+      </p:sp>
+      <p:sp>
+        <p:nvSpPr>
+          <p:cNvPr id="102" name="TextBox 101">
+            <a:extLst>
+              <a:ext uri="{FF2B5EF4-FFF2-40B4-BE49-F238E27FC236}">
+                <a16:creationId xmlns:a16="http://schemas.microsoft.com/office/drawing/2014/main" id="{B22463A1-97D2-4677-ABE8-40C5D6C358A7}"/>
+              </a:ext>
+            </a:extLst>
+          </p:cNvPr>
+          <p:cNvSpPr txBox="1"/>
+          <p:nvPr/>
+        </p:nvSpPr>
+        <p:spPr>
+          <a:xfrm>
+            <a:off x="7784213" y="3671894"/>
+            <a:ext cx="382513" cy="369332"/>
+          </a:xfrm>
+          <a:prstGeom prst="rect">
+            <a:avLst/>
+          </a:prstGeom>
+          <a:noFill/>
+        </p:spPr>
+        <p:txBody>
+          <a:bodyPr wrap="square" rtlCol="0">
+            <a:spAutoFit/>
+          </a:bodyPr>
+          <a:lstStyle/>
+          <a:p>
+            <a:r>
+              <a:rPr lang="ko-KR" altLang="en-US" b="1" dirty="0">
+                <a:solidFill>
+                  <a:srgbClr val="0000FF"/>
+                </a:solidFill>
+              </a:rPr>
+              <a:t>③</a:t>
+            </a:r>
+          </a:p>
+        </p:txBody>
+      </p:sp>
+      <p:sp>
+        <p:nvSpPr>
+          <p:cNvPr id="103" name="TextBox 102">
+            <a:extLst>
+              <a:ext uri="{FF2B5EF4-FFF2-40B4-BE49-F238E27FC236}">
+                <a16:creationId xmlns:a16="http://schemas.microsoft.com/office/drawing/2014/main" id="{DBC708F7-B844-4F28-BF93-30119BFA38E4}"/>
+              </a:ext>
+            </a:extLst>
+          </p:cNvPr>
+          <p:cNvSpPr txBox="1"/>
+          <p:nvPr/>
+        </p:nvSpPr>
+        <p:spPr>
+          <a:xfrm>
+            <a:off x="5801034" y="3915305"/>
+            <a:ext cx="364922" cy="369332"/>
+          </a:xfrm>
+          <a:prstGeom prst="rect">
+            <a:avLst/>
+          </a:prstGeom>
+          <a:noFill/>
+        </p:spPr>
+        <p:txBody>
+          <a:bodyPr wrap="square" rtlCol="0">
+            <a:spAutoFit/>
+          </a:bodyPr>
+          <a:lstStyle/>
+          <a:p>
+            <a:r>
+              <a:rPr lang="ko-KR" altLang="en-US" b="1" dirty="0">
+                <a:solidFill>
+                  <a:srgbClr val="FF0000"/>
+                </a:solidFill>
+              </a:rPr>
+              <a:t>①</a:t>
+            </a:r>
+          </a:p>
+        </p:txBody>
+      </p:sp>
+      <p:sp>
+        <p:nvSpPr>
+          <p:cNvPr id="104" name="TextBox 103">
+            <a:extLst>
+              <a:ext uri="{FF2B5EF4-FFF2-40B4-BE49-F238E27FC236}">
+                <a16:creationId xmlns:a16="http://schemas.microsoft.com/office/drawing/2014/main" id="{35D78A5C-3E8C-4212-94CA-70203D723E67}"/>
+              </a:ext>
+            </a:extLst>
+          </p:cNvPr>
+          <p:cNvSpPr txBox="1"/>
+          <p:nvPr/>
+        </p:nvSpPr>
+        <p:spPr>
+          <a:xfrm>
+            <a:off x="6253736" y="3555877"/>
+            <a:ext cx="382513" cy="369332"/>
+          </a:xfrm>
+          <a:prstGeom prst="rect">
+            <a:avLst/>
+          </a:prstGeom>
+          <a:noFill/>
+        </p:spPr>
+        <p:txBody>
+          <a:bodyPr wrap="square" rtlCol="0">
+            <a:spAutoFit/>
+          </a:bodyPr>
+          <a:lstStyle/>
+          <a:p>
+            <a:r>
+              <a:rPr lang="ko-KR" altLang="en-US" b="1" dirty="0">
+                <a:solidFill>
+                  <a:srgbClr val="FF0000"/>
+                </a:solidFill>
+              </a:rPr>
+              <a:t>②</a:t>
+            </a:r>
+          </a:p>
+        </p:txBody>
+      </p:sp>
+      <p:sp>
+        <p:nvSpPr>
+          <p:cNvPr id="105" name="TextBox 104">
+            <a:extLst>
+              <a:ext uri="{FF2B5EF4-FFF2-40B4-BE49-F238E27FC236}">
+                <a16:creationId xmlns:a16="http://schemas.microsoft.com/office/drawing/2014/main" id="{81B41F90-274F-43D5-BAC6-9E0089E0C477}"/>
+              </a:ext>
+            </a:extLst>
+          </p:cNvPr>
+          <p:cNvSpPr txBox="1"/>
+          <p:nvPr/>
+        </p:nvSpPr>
+        <p:spPr>
+          <a:xfrm>
+            <a:off x="10605220" y="35882"/>
+            <a:ext cx="1497879" cy="646331"/>
+          </a:xfrm>
+          <a:prstGeom prst="rect">
+            <a:avLst/>
+          </a:prstGeom>
+          <a:solidFill>
+            <a:schemeClr val="bg1"/>
+          </a:solidFill>
+          <a:ln w="19050">
+            <a:solidFill>
+              <a:schemeClr val="tx1"/>
+            </a:solidFill>
+            <a:prstDash val="solid"/>
+          </a:ln>
+        </p:spPr>
+        <p:txBody>
+          <a:bodyPr wrap="square" rtlCol="0">
+            <a:spAutoFit/>
+          </a:bodyPr>
+          <a:lstStyle/>
+          <a:p>
+            <a:pPr algn="r"/>
+            <a:r>
+              <a:rPr lang="en-US" altLang="ko-KR" sz="1200" dirty="0" err="1"/>
+              <a:t>Frontdoor</a:t>
+            </a:r>
+            <a:endParaRPr lang="en-US" altLang="ko-KR" sz="1200" dirty="0"/>
+          </a:p>
+          <a:p>
+            <a:pPr algn="r"/>
+            <a:r>
+              <a:rPr lang="en-US" altLang="ko-KR" sz="1200" dirty="0"/>
+              <a:t>Predictor</a:t>
+            </a:r>
+          </a:p>
+          <a:p>
+            <a:pPr algn="r"/>
+            <a:r>
+              <a:rPr lang="en-US" altLang="ko-KR" sz="1200" dirty="0"/>
+              <a:t>others</a:t>
+            </a:r>
+            <a:endParaRPr lang="ko-KR" altLang="en-US" sz="1200" dirty="0"/>
+          </a:p>
+        </p:txBody>
+      </p:sp>
+      <p:cxnSp>
+        <p:nvCxnSpPr>
+          <p:cNvPr id="107" name="직선 연결선 106">
+            <a:extLst>
+              <a:ext uri="{FF2B5EF4-FFF2-40B4-BE49-F238E27FC236}">
+                <a16:creationId xmlns:a16="http://schemas.microsoft.com/office/drawing/2014/main" id="{335CCC17-1DA2-460C-B95D-443EFBB3F468}"/>
+              </a:ext>
+            </a:extLst>
+          </p:cNvPr>
+          <p:cNvCxnSpPr/>
+          <p:nvPr/>
+        </p:nvCxnSpPr>
+        <p:spPr>
+          <a:xfrm>
+            <a:off x="10738623" y="184667"/>
+            <a:ext cx="456427" cy="0"/>
+          </a:xfrm>
+          <a:prstGeom prst="line">
+            <a:avLst/>
+          </a:prstGeom>
+          <a:ln w="38100">
+            <a:solidFill>
+              <a:srgbClr val="FF0000"/>
+            </a:solidFill>
+          </a:ln>
+        </p:spPr>
+        <p:style>
+          <a:lnRef idx="1">
+            <a:schemeClr val="accent1"/>
+          </a:lnRef>
+          <a:fillRef idx="0">
+            <a:schemeClr val="accent1"/>
+          </a:fillRef>
+          <a:effectRef idx="0">
+            <a:schemeClr val="accent1"/>
+          </a:effectRef>
+          <a:fontRef idx="minor">
+            <a:schemeClr val="tx1"/>
+          </a:fontRef>
+        </p:style>
+      </p:cxnSp>
+      <p:cxnSp>
+        <p:nvCxnSpPr>
+          <p:cNvPr id="108" name="직선 연결선 107">
+            <a:extLst>
+              <a:ext uri="{FF2B5EF4-FFF2-40B4-BE49-F238E27FC236}">
+                <a16:creationId xmlns:a16="http://schemas.microsoft.com/office/drawing/2014/main" id="{E6CC0087-ACC4-4BF8-B50A-69CBA44E7FB2}"/>
+              </a:ext>
+            </a:extLst>
+          </p:cNvPr>
+          <p:cNvCxnSpPr/>
+          <p:nvPr/>
+        </p:nvCxnSpPr>
+        <p:spPr>
+          <a:xfrm>
+            <a:off x="10738623" y="368817"/>
+            <a:ext cx="456427" cy="0"/>
+          </a:xfrm>
+          <a:prstGeom prst="line">
+            <a:avLst/>
+          </a:prstGeom>
+          <a:ln w="38100">
+            <a:solidFill>
+              <a:srgbClr val="0000FF"/>
+            </a:solidFill>
+          </a:ln>
+        </p:spPr>
+        <p:style>
+          <a:lnRef idx="1">
+            <a:schemeClr val="accent1"/>
+          </a:lnRef>
+          <a:fillRef idx="0">
+            <a:schemeClr val="accent1"/>
+          </a:fillRef>
+          <a:effectRef idx="0">
+            <a:schemeClr val="accent1"/>
+          </a:effectRef>
+          <a:fontRef idx="minor">
+            <a:schemeClr val="tx1"/>
+          </a:fontRef>
+        </p:style>
+      </p:cxnSp>
+      <p:cxnSp>
+        <p:nvCxnSpPr>
+          <p:cNvPr id="109" name="직선 연결선 108">
+            <a:extLst>
+              <a:ext uri="{FF2B5EF4-FFF2-40B4-BE49-F238E27FC236}">
+                <a16:creationId xmlns:a16="http://schemas.microsoft.com/office/drawing/2014/main" id="{FFF97EF6-93D7-4E54-9BD2-F63B62337FB2}"/>
+              </a:ext>
+            </a:extLst>
+          </p:cNvPr>
+          <p:cNvCxnSpPr/>
+          <p:nvPr/>
+        </p:nvCxnSpPr>
+        <p:spPr>
+          <a:xfrm>
+            <a:off x="10738623" y="555145"/>
+            <a:ext cx="456427" cy="0"/>
+          </a:xfrm>
+          <a:prstGeom prst="line">
+            <a:avLst/>
+          </a:prstGeom>
+          <a:ln w="38100">
+            <a:solidFill>
+              <a:schemeClr val="tx1"/>
+            </a:solidFill>
           </a:ln>
         </p:spPr>
         <p:style>

</xml_diff>

<commit_message>
update pptx file drawing block diagram
</commit_message>
<xml_diff>
--- a/example/4.reg_model/resource/Chipverify_regModel_2_Complete_UVCs_Block_Diagram.pptx
+++ b/example/4.reg_model/resource/Chipverify_regModel_2_Complete_UVCs_Block_Diagram.pptx
@@ -259,7 +259,7 @@
           <a:p>
             <a:fld id="{23DD17FB-2739-4771-AAD2-B52165E10269}" type="datetimeFigureOut">
               <a:rPr lang="ko-KR" altLang="en-US" smtClean="0"/>
-              <a:t>2022-02-07</a:t>
+              <a:t>2022-02-20</a:t>
             </a:fld>
             <a:endParaRPr lang="ko-KR" altLang="en-US"/>
           </a:p>
@@ -457,7 +457,7 @@
           <a:p>
             <a:fld id="{23DD17FB-2739-4771-AAD2-B52165E10269}" type="datetimeFigureOut">
               <a:rPr lang="ko-KR" altLang="en-US" smtClean="0"/>
-              <a:t>2022-02-07</a:t>
+              <a:t>2022-02-20</a:t>
             </a:fld>
             <a:endParaRPr lang="ko-KR" altLang="en-US"/>
           </a:p>
@@ -665,7 +665,7 @@
           <a:p>
             <a:fld id="{23DD17FB-2739-4771-AAD2-B52165E10269}" type="datetimeFigureOut">
               <a:rPr lang="ko-KR" altLang="en-US" smtClean="0"/>
-              <a:t>2022-02-07</a:t>
+              <a:t>2022-02-20</a:t>
             </a:fld>
             <a:endParaRPr lang="ko-KR" altLang="en-US"/>
           </a:p>
@@ -863,7 +863,7 @@
           <a:p>
             <a:fld id="{23DD17FB-2739-4771-AAD2-B52165E10269}" type="datetimeFigureOut">
               <a:rPr lang="ko-KR" altLang="en-US" smtClean="0"/>
-              <a:t>2022-02-07</a:t>
+              <a:t>2022-02-20</a:t>
             </a:fld>
             <a:endParaRPr lang="ko-KR" altLang="en-US"/>
           </a:p>
@@ -1138,7 +1138,7 @@
           <a:p>
             <a:fld id="{23DD17FB-2739-4771-AAD2-B52165E10269}" type="datetimeFigureOut">
               <a:rPr lang="ko-KR" altLang="en-US" smtClean="0"/>
-              <a:t>2022-02-07</a:t>
+              <a:t>2022-02-20</a:t>
             </a:fld>
             <a:endParaRPr lang="ko-KR" altLang="en-US"/>
           </a:p>
@@ -1403,7 +1403,7 @@
           <a:p>
             <a:fld id="{23DD17FB-2739-4771-AAD2-B52165E10269}" type="datetimeFigureOut">
               <a:rPr lang="ko-KR" altLang="en-US" smtClean="0"/>
-              <a:t>2022-02-07</a:t>
+              <a:t>2022-02-20</a:t>
             </a:fld>
             <a:endParaRPr lang="ko-KR" altLang="en-US"/>
           </a:p>
@@ -1815,7 +1815,7 @@
           <a:p>
             <a:fld id="{23DD17FB-2739-4771-AAD2-B52165E10269}" type="datetimeFigureOut">
               <a:rPr lang="ko-KR" altLang="en-US" smtClean="0"/>
-              <a:t>2022-02-07</a:t>
+              <a:t>2022-02-20</a:t>
             </a:fld>
             <a:endParaRPr lang="ko-KR" altLang="en-US"/>
           </a:p>
@@ -1956,7 +1956,7 @@
           <a:p>
             <a:fld id="{23DD17FB-2739-4771-AAD2-B52165E10269}" type="datetimeFigureOut">
               <a:rPr lang="ko-KR" altLang="en-US" smtClean="0"/>
-              <a:t>2022-02-07</a:t>
+              <a:t>2022-02-20</a:t>
             </a:fld>
             <a:endParaRPr lang="ko-KR" altLang="en-US"/>
           </a:p>
@@ -2069,7 +2069,7 @@
           <a:p>
             <a:fld id="{23DD17FB-2739-4771-AAD2-B52165E10269}" type="datetimeFigureOut">
               <a:rPr lang="ko-KR" altLang="en-US" smtClean="0"/>
-              <a:t>2022-02-07</a:t>
+              <a:t>2022-02-20</a:t>
             </a:fld>
             <a:endParaRPr lang="ko-KR" altLang="en-US"/>
           </a:p>
@@ -2380,7 +2380,7 @@
           <a:p>
             <a:fld id="{23DD17FB-2739-4771-AAD2-B52165E10269}" type="datetimeFigureOut">
               <a:rPr lang="ko-KR" altLang="en-US" smtClean="0"/>
-              <a:t>2022-02-07</a:t>
+              <a:t>2022-02-20</a:t>
             </a:fld>
             <a:endParaRPr lang="ko-KR" altLang="en-US"/>
           </a:p>
@@ -2668,7 +2668,7 @@
           <a:p>
             <a:fld id="{23DD17FB-2739-4771-AAD2-B52165E10269}" type="datetimeFigureOut">
               <a:rPr lang="ko-KR" altLang="en-US" smtClean="0"/>
-              <a:t>2022-02-07</a:t>
+              <a:t>2022-02-20</a:t>
             </a:fld>
             <a:endParaRPr lang="ko-KR" altLang="en-US"/>
           </a:p>
@@ -2909,7 +2909,7 @@
           <a:p>
             <a:fld id="{23DD17FB-2739-4771-AAD2-B52165E10269}" type="datetimeFigureOut">
               <a:rPr lang="ko-KR" altLang="en-US" smtClean="0"/>
-              <a:t>2022-02-07</a:t>
+              <a:t>2022-02-20</a:t>
             </a:fld>
             <a:endParaRPr lang="ko-KR" altLang="en-US"/>
           </a:p>
@@ -4485,13 +4485,12 @@
           </p:cNvPr>
           <p:cNvCxnSpPr>
             <a:cxnSpLocks/>
-            <a:stCxn id="15" idx="3"/>
           </p:cNvCxnSpPr>
           <p:nvPr/>
         </p:nvCxnSpPr>
         <p:spPr>
           <a:xfrm>
-            <a:off x="8449091" y="1027720"/>
+            <a:off x="8449091" y="1020907"/>
             <a:ext cx="1094763" cy="0"/>
           </a:xfrm>
           <a:prstGeom prst="straightConnector1">
@@ -4501,7 +4500,8 @@
             <a:solidFill>
               <a:schemeClr val="tx1"/>
             </a:solidFill>
-            <a:tailEnd type="triangle"/>
+            <a:headEnd w="lg" len="lg"/>
+            <a:tailEnd type="triangle" w="lg" len="lg"/>
           </a:ln>
         </p:spPr>
         <p:style>
@@ -4535,7 +4535,7 @@
         </p:nvCxnSpPr>
         <p:spPr>
           <a:xfrm flipH="1">
-            <a:off x="8449091" y="1798909"/>
+            <a:off x="8449091" y="1684609"/>
             <a:ext cx="1094763" cy="0"/>
           </a:xfrm>
           <a:prstGeom prst="straightConnector1">
@@ -4545,7 +4545,8 @@
             <a:solidFill>
               <a:schemeClr val="tx1"/>
             </a:solidFill>
-            <a:tailEnd type="triangle"/>
+            <a:headEnd w="lg" len="lg"/>
+            <a:tailEnd type="triangle" w="lg" len="lg"/>
           </a:ln>
         </p:spPr>
         <p:style>
@@ -4594,7 +4595,8 @@
             <a:solidFill>
               <a:srgbClr val="FF0000"/>
             </a:solidFill>
-            <a:tailEnd type="triangle"/>
+            <a:headEnd w="lg" len="lg"/>
+            <a:tailEnd type="triangle" w="lg" len="lg"/>
           </a:ln>
         </p:spPr>
         <p:style>
@@ -4626,7 +4628,7 @@
         </p:nvSpPr>
         <p:spPr>
           <a:xfrm>
-            <a:off x="7599716" y="1961996"/>
+            <a:off x="7704913" y="1961996"/>
             <a:ext cx="254214" cy="237491"/>
           </a:xfrm>
           <a:prstGeom prst="diamond">
@@ -4683,7 +4685,7 @@
         </p:nvCxnSpPr>
         <p:spPr>
           <a:xfrm>
-            <a:off x="7726823" y="2199487"/>
+            <a:off x="7832020" y="2199487"/>
             <a:ext cx="0" cy="712065"/>
           </a:xfrm>
           <a:prstGeom prst="straightConnector1">
@@ -4693,7 +4695,8 @@
             <a:solidFill>
               <a:srgbClr val="0000FF"/>
             </a:solidFill>
-            <a:tailEnd type="triangle"/>
+            <a:headEnd w="lg" len="lg"/>
+            <a:tailEnd type="triangle" w="lg" len="lg"/>
           </a:ln>
         </p:spPr>
         <p:style>
@@ -4765,6 +4768,28 @@
             </a:r>
             <a:endParaRPr lang="en-US" altLang="ko-KR" dirty="0"/>
           </a:p>
+          <a:p>
+            <a:pPr algn="ctr"/>
+            <a:r>
+              <a:rPr lang="en-US" altLang="ko-KR" dirty="0"/>
+              <a:t>(</a:t>
+            </a:r>
+            <a:r>
+              <a:rPr lang="en-US" altLang="ko-KR" dirty="0" err="1"/>
+              <a:t>uvm_reg</a:t>
+            </a:r>
+            <a:r>
+              <a:rPr lang="en-US" altLang="ko-KR" dirty="0"/>
+              <a:t>_</a:t>
+            </a:r>
+            <a:br>
+              <a:rPr lang="en-US" altLang="ko-KR" dirty="0"/>
+            </a:br>
+            <a:r>
+              <a:rPr lang="en-US" altLang="ko-KR" dirty="0"/>
+              <a:t>map)</a:t>
+            </a:r>
+          </a:p>
         </p:txBody>
       </p:sp>
       <p:cxnSp>
@@ -4793,7 +4818,8 @@
             <a:solidFill>
               <a:schemeClr val="tx1"/>
             </a:solidFill>
-            <a:tailEnd type="triangle"/>
+            <a:headEnd w="lg" len="lg"/>
+            <a:tailEnd type="triangle" w="lg" len="lg"/>
           </a:ln>
         </p:spPr>
         <p:style>
@@ -4837,7 +4863,8 @@
             <a:solidFill>
               <a:schemeClr val="tx1"/>
             </a:solidFill>
-            <a:tailEnd type="triangle"/>
+            <a:headEnd w="lg" len="lg"/>
+            <a:tailEnd type="triangle" w="lg" len="lg"/>
           </a:ln>
         </p:spPr>
         <p:style>
@@ -4866,13 +4893,12 @@
           </p:cNvPr>
           <p:cNvCxnSpPr>
             <a:cxnSpLocks/>
-            <a:endCxn id="15" idx="1"/>
           </p:cNvCxnSpPr>
           <p:nvPr/>
         </p:nvCxnSpPr>
         <p:spPr>
           <a:xfrm flipV="1">
-            <a:off x="5564352" y="1027720"/>
+            <a:off x="5564352" y="899041"/>
             <a:ext cx="1173504" cy="656890"/>
           </a:xfrm>
           <a:prstGeom prst="straightConnector1">
@@ -4880,9 +4906,10 @@
           </a:prstGeom>
           <a:ln w="28575">
             <a:solidFill>
-              <a:schemeClr val="tx1"/>
+              <a:srgbClr val="FF0000"/>
             </a:solidFill>
-            <a:tailEnd type="triangle"/>
+            <a:headEnd w="lg" len="lg"/>
+            <a:tailEnd type="triangle" w="lg" len="lg"/>
           </a:ln>
         </p:spPr>
         <p:style>
@@ -4916,8 +4943,8 @@
         </p:nvCxnSpPr>
         <p:spPr>
           <a:xfrm>
-            <a:off x="7720580" y="3504832"/>
-            <a:ext cx="0" cy="806490"/>
+            <a:off x="7832020" y="3504832"/>
+            <a:ext cx="0" cy="818569"/>
           </a:xfrm>
           <a:prstGeom prst="straightConnector1">
             <a:avLst/>
@@ -4926,7 +4953,8 @@
             <a:solidFill>
               <a:srgbClr val="0000FF"/>
             </a:solidFill>
-            <a:tailEnd type="triangle"/>
+            <a:headEnd type="none" w="sm" len="sm"/>
+            <a:tailEnd type="triangle" w="lg" len="lg"/>
           </a:ln>
         </p:spPr>
         <p:style>
@@ -4954,15 +4982,14 @@
             </a:extLst>
           </p:cNvPr>
           <p:cNvCxnSpPr>
-            <a:stCxn id="30" idx="3"/>
-            <a:endCxn id="28" idx="1"/>
+            <a:cxnSpLocks/>
           </p:cNvCxnSpPr>
           <p:nvPr/>
         </p:nvCxnSpPr>
         <p:spPr>
           <a:xfrm>
-            <a:off x="5058776" y="3210755"/>
-            <a:ext cx="1411292" cy="0"/>
+            <a:off x="3118245" y="3116751"/>
+            <a:ext cx="3349709" cy="0"/>
           </a:xfrm>
           <a:prstGeom prst="line">
             <a:avLst/>
@@ -4971,8 +4998,8 @@
             <a:solidFill>
               <a:srgbClr val="0000FF"/>
             </a:solidFill>
-            <a:headEnd type="arrow" w="med" len="med"/>
-            <a:tailEnd type="arrow" w="med" len="med"/>
+            <a:headEnd type="triangle" w="lg" len="lg"/>
+            <a:tailEnd type="none" w="med" len="med"/>
           </a:ln>
         </p:spPr>
         <p:style>
@@ -5004,7 +5031,7 @@
         </p:nvSpPr>
         <p:spPr>
           <a:xfrm>
-            <a:off x="2811965" y="2911552"/>
+            <a:off x="873548" y="2911552"/>
             <a:ext cx="2246811" cy="598405"/>
           </a:xfrm>
           <a:prstGeom prst="rect">
@@ -5063,14 +5090,13 @@
           <p:cNvCxnSpPr>
             <a:cxnSpLocks/>
             <a:stCxn id="30" idx="2"/>
-            <a:endCxn id="38" idx="0"/>
           </p:cNvCxnSpPr>
           <p:nvPr/>
         </p:nvCxnSpPr>
         <p:spPr>
           <a:xfrm>
-            <a:off x="3935371" y="3509957"/>
-            <a:ext cx="3789944" cy="813444"/>
+            <a:off x="1996954" y="3509957"/>
+            <a:ext cx="4967120" cy="903868"/>
           </a:xfrm>
           <a:prstGeom prst="straightConnector1">
             <a:avLst/>
@@ -5079,8 +5105,8 @@
             <a:solidFill>
               <a:srgbClr val="FF0000"/>
             </a:solidFill>
-            <a:headEnd type="triangle"/>
-            <a:tailEnd type="triangle"/>
+            <a:headEnd type="triangle" w="lg" len="lg"/>
+            <a:tailEnd type="none" w="med" len="med"/>
           </a:ln>
         </p:spPr>
         <p:style>
@@ -5149,6 +5175,18 @@
             <a:r>
               <a:rPr lang="en-US" altLang="ko-KR" dirty="0" err="1"/>
               <a:t>default_map</a:t>
+            </a:r>
+            <a:r>
+              <a:rPr lang="en-US" altLang="ko-KR" dirty="0"/>
+              <a:t>(</a:t>
+            </a:r>
+            <a:r>
+              <a:rPr lang="en-US" altLang="ko-KR" dirty="0" err="1"/>
+              <a:t>uvm_reg_map</a:t>
+            </a:r>
+            <a:r>
+              <a:rPr lang="en-US" altLang="ko-KR"/>
+              <a:t>)</a:t>
             </a:r>
             <a:endParaRPr lang="en-US" altLang="ko-KR" dirty="0"/>
           </a:p>
@@ -5498,7 +5536,7 @@
         </p:nvSpPr>
         <p:spPr>
           <a:xfrm>
-            <a:off x="7789305" y="2017535"/>
+            <a:off x="7846461" y="2521102"/>
             <a:ext cx="364922" cy="369332"/>
           </a:xfrm>
           <a:prstGeom prst="rect">
@@ -5537,7 +5575,7 @@
         </p:nvSpPr>
         <p:spPr>
           <a:xfrm>
-            <a:off x="5588822" y="2836730"/>
+            <a:off x="3046270" y="2723540"/>
             <a:ext cx="382513" cy="369332"/>
           </a:xfrm>
           <a:prstGeom prst="rect">
@@ -5576,7 +5614,7 @@
         </p:nvSpPr>
         <p:spPr>
           <a:xfrm>
-            <a:off x="7784213" y="3671894"/>
+            <a:off x="7868255" y="3891151"/>
             <a:ext cx="382513" cy="369332"/>
           </a:xfrm>
           <a:prstGeom prst="rect">
@@ -5596,7 +5634,7 @@
                   <a:srgbClr val="0000FF"/>
                 </a:solidFill>
               </a:rPr>
-              <a:t>③</a:t>
+              <a:t>④</a:t>
             </a:r>
           </a:p>
         </p:txBody>
@@ -5615,8 +5653,8 @@
         </p:nvSpPr>
         <p:spPr>
           <a:xfrm>
-            <a:off x="5801034" y="3915305"/>
-            <a:ext cx="364922" cy="369332"/>
+            <a:off x="1342593" y="3437316"/>
+            <a:ext cx="907203" cy="369332"/>
           </a:xfrm>
           <a:prstGeom prst="rect">
             <a:avLst/>
@@ -5637,6 +5675,22 @@
               </a:rPr>
               <a:t>①</a:t>
             </a:r>
+            <a:r>
+              <a:rPr lang="en-US" altLang="ko-KR" b="1" dirty="0">
+                <a:solidFill>
+                  <a:srgbClr val="FF0000"/>
+                </a:solidFill>
+              </a:rPr>
+              <a:t>, </a:t>
+            </a:r>
+            <a:r>
+              <a:rPr lang="ko-KR" altLang="en-US" b="1" dirty="0">
+                <a:solidFill>
+                  <a:srgbClr val="FF0000"/>
+                </a:solidFill>
+              </a:rPr>
+              <a:t>⑤</a:t>
+            </a:r>
           </a:p>
         </p:txBody>
       </p:sp>
@@ -5654,8 +5708,8 @@
         </p:nvSpPr>
         <p:spPr>
           <a:xfrm>
-            <a:off x="6253736" y="3555877"/>
-            <a:ext cx="382513" cy="369332"/>
+            <a:off x="6226314" y="3810717"/>
+            <a:ext cx="853867" cy="369332"/>
           </a:xfrm>
           <a:prstGeom prst="rect">
             <a:avLst/>
@@ -5675,6 +5729,22 @@
                 </a:solidFill>
               </a:rPr>
               <a:t>②</a:t>
+            </a:r>
+            <a:r>
+              <a:rPr lang="en-US" altLang="ko-KR" b="1" dirty="0">
+                <a:solidFill>
+                  <a:srgbClr val="FF0000"/>
+                </a:solidFill>
+              </a:rPr>
+              <a:t>, </a:t>
+            </a:r>
+            <a:r>
+              <a:rPr lang="ko-KR" altLang="en-US" b="1" dirty="0">
+                <a:solidFill>
+                  <a:srgbClr val="FF0000"/>
+                </a:solidFill>
+              </a:rPr>
+              <a:t>⑥</a:t>
             </a:r>
           </a:p>
         </p:txBody>
@@ -5862,6 +5932,211 @@
           </a:fontRef>
         </p:style>
       </p:cxnSp>
+      <p:cxnSp>
+        <p:nvCxnSpPr>
+          <p:cNvPr id="59" name="직선 화살표 연결선 58">
+            <a:extLst>
+              <a:ext uri="{FF2B5EF4-FFF2-40B4-BE49-F238E27FC236}">
+                <a16:creationId xmlns:a16="http://schemas.microsoft.com/office/drawing/2014/main" id="{554E5315-03A9-4EB0-938A-A21BBC300C1C}"/>
+              </a:ext>
+            </a:extLst>
+          </p:cNvPr>
+          <p:cNvCxnSpPr>
+            <a:cxnSpLocks/>
+          </p:cNvCxnSpPr>
+          <p:nvPr/>
+        </p:nvCxnSpPr>
+        <p:spPr>
+          <a:xfrm>
+            <a:off x="2752217" y="3502442"/>
+            <a:ext cx="4347666" cy="803490"/>
+          </a:xfrm>
+          <a:prstGeom prst="straightConnector1">
+            <a:avLst/>
+          </a:prstGeom>
+          <a:ln w="38100">
+            <a:solidFill>
+              <a:srgbClr val="FF0000"/>
+            </a:solidFill>
+            <a:headEnd type="none" w="lg" len="lg"/>
+            <a:tailEnd type="triangle" w="lg" len="lg"/>
+          </a:ln>
+        </p:spPr>
+        <p:style>
+          <a:lnRef idx="1">
+            <a:schemeClr val="accent1"/>
+          </a:lnRef>
+          <a:fillRef idx="0">
+            <a:schemeClr val="accent1"/>
+          </a:fillRef>
+          <a:effectRef idx="0">
+            <a:schemeClr val="accent1"/>
+          </a:effectRef>
+          <a:fontRef idx="minor">
+            <a:schemeClr val="tx1"/>
+          </a:fontRef>
+        </p:style>
+      </p:cxnSp>
+      <p:cxnSp>
+        <p:nvCxnSpPr>
+          <p:cNvPr id="61" name="직선 연결선 60">
+            <a:extLst>
+              <a:ext uri="{FF2B5EF4-FFF2-40B4-BE49-F238E27FC236}">
+                <a16:creationId xmlns:a16="http://schemas.microsoft.com/office/drawing/2014/main" id="{B9999A67-7203-40D1-9260-CA1A63D61386}"/>
+              </a:ext>
+            </a:extLst>
+          </p:cNvPr>
+          <p:cNvCxnSpPr/>
+          <p:nvPr/>
+        </p:nvCxnSpPr>
+        <p:spPr>
+          <a:xfrm>
+            <a:off x="3118245" y="3410312"/>
+            <a:ext cx="3349709" cy="0"/>
+          </a:xfrm>
+          <a:prstGeom prst="line">
+            <a:avLst/>
+          </a:prstGeom>
+          <a:ln w="38100">
+            <a:solidFill>
+              <a:srgbClr val="0000FF"/>
+            </a:solidFill>
+            <a:headEnd type="none" w="sm" len="sm"/>
+            <a:tailEnd type="triangle" w="lg" len="lg"/>
+          </a:ln>
+        </p:spPr>
+        <p:style>
+          <a:lnRef idx="1">
+            <a:schemeClr val="accent1"/>
+          </a:lnRef>
+          <a:fillRef idx="0">
+            <a:schemeClr val="accent1"/>
+          </a:fillRef>
+          <a:effectRef idx="0">
+            <a:schemeClr val="accent1"/>
+          </a:effectRef>
+          <a:fontRef idx="minor">
+            <a:schemeClr val="tx1"/>
+          </a:fontRef>
+        </p:style>
+      </p:cxnSp>
+      <p:sp>
+        <p:nvSpPr>
+          <p:cNvPr id="62" name="TextBox 61">
+            <a:extLst>
+              <a:ext uri="{FF2B5EF4-FFF2-40B4-BE49-F238E27FC236}">
+                <a16:creationId xmlns:a16="http://schemas.microsoft.com/office/drawing/2014/main" id="{4347CF5A-0D4F-4559-BA15-19FD2B5F48A4}"/>
+              </a:ext>
+            </a:extLst>
+          </p:cNvPr>
+          <p:cNvSpPr txBox="1"/>
+          <p:nvPr/>
+        </p:nvSpPr>
+        <p:spPr>
+          <a:xfrm>
+            <a:off x="2881364" y="1598563"/>
+            <a:ext cx="382513" cy="369332"/>
+          </a:xfrm>
+          <a:prstGeom prst="rect">
+            <a:avLst/>
+          </a:prstGeom>
+          <a:noFill/>
+        </p:spPr>
+        <p:txBody>
+          <a:bodyPr wrap="square" rtlCol="0">
+            <a:spAutoFit/>
+          </a:bodyPr>
+          <a:lstStyle/>
+          <a:p>
+            <a:r>
+              <a:rPr lang="ko-KR" altLang="en-US" b="1" dirty="0">
+                <a:solidFill>
+                  <a:srgbClr val="FF0000"/>
+                </a:solidFill>
+              </a:rPr>
+              <a:t>③</a:t>
+            </a:r>
+          </a:p>
+        </p:txBody>
+      </p:sp>
+      <p:sp>
+        <p:nvSpPr>
+          <p:cNvPr id="63" name="TextBox 62">
+            <a:extLst>
+              <a:ext uri="{FF2B5EF4-FFF2-40B4-BE49-F238E27FC236}">
+                <a16:creationId xmlns:a16="http://schemas.microsoft.com/office/drawing/2014/main" id="{6419E417-30AD-49A0-B1CE-291E96EEC9C9}"/>
+              </a:ext>
+            </a:extLst>
+          </p:cNvPr>
+          <p:cNvSpPr txBox="1"/>
+          <p:nvPr/>
+        </p:nvSpPr>
+        <p:spPr>
+          <a:xfrm>
+            <a:off x="5912420" y="3064860"/>
+            <a:ext cx="382513" cy="369332"/>
+          </a:xfrm>
+          <a:prstGeom prst="rect">
+            <a:avLst/>
+          </a:prstGeom>
+          <a:noFill/>
+        </p:spPr>
+        <p:txBody>
+          <a:bodyPr wrap="square" rtlCol="0">
+            <a:spAutoFit/>
+          </a:bodyPr>
+          <a:lstStyle/>
+          <a:p>
+            <a:r>
+              <a:rPr lang="ko-KR" altLang="en-US" b="1" dirty="0">
+                <a:solidFill>
+                  <a:srgbClr val="0000FF"/>
+                </a:solidFill>
+              </a:rPr>
+              <a:t>③</a:t>
+            </a:r>
+          </a:p>
+        </p:txBody>
+      </p:sp>
+      <p:sp>
+        <p:nvSpPr>
+          <p:cNvPr id="67" name="TextBox 66">
+            <a:extLst>
+              <a:ext uri="{FF2B5EF4-FFF2-40B4-BE49-F238E27FC236}">
+                <a16:creationId xmlns:a16="http://schemas.microsoft.com/office/drawing/2014/main" id="{81413929-9E7D-43FA-B5A9-DEB2B4DC4E58}"/>
+              </a:ext>
+            </a:extLst>
+          </p:cNvPr>
+          <p:cNvSpPr txBox="1"/>
+          <p:nvPr/>
+        </p:nvSpPr>
+        <p:spPr>
+          <a:xfrm>
+            <a:off x="5809763" y="880363"/>
+            <a:ext cx="382513" cy="369332"/>
+          </a:xfrm>
+          <a:prstGeom prst="rect">
+            <a:avLst/>
+          </a:prstGeom>
+          <a:noFill/>
+        </p:spPr>
+        <p:txBody>
+          <a:bodyPr wrap="square" rtlCol="0">
+            <a:spAutoFit/>
+          </a:bodyPr>
+          <a:lstStyle/>
+          <a:p>
+            <a:r>
+              <a:rPr lang="ko-KR" altLang="en-US" b="1" dirty="0">
+                <a:solidFill>
+                  <a:srgbClr val="FF0000"/>
+                </a:solidFill>
+              </a:rPr>
+              <a:t>④</a:t>
+            </a:r>
+          </a:p>
+        </p:txBody>
+      </p:sp>
     </p:spTree>
     <p:extLst>
       <p:ext uri="{BB962C8B-B14F-4D97-AF65-F5344CB8AC3E}">

</xml_diff>